<commit_message>
Präsentation fehler beseitigung + bild
</commit_message>
<xml_diff>
--- a/Präsi/Supply Chain Manager_v2.pptx
+++ b/Präsi/Supply Chain Manager_v2.pptx
@@ -123,6 +123,22 @@
       </a:defRPr>
     </a:lvl9pPr>
   </p:defaultTextStyle>
+  <p:extLst>
+    <p:ext uri="{EFAFB233-063F-42B5-8137-9DF3F51BA10A}">
+      <p15:sldGuideLst xmlns:p15="http://schemas.microsoft.com/office/powerpoint/2012/main">
+        <p15:guide id="1" orient="horz" pos="2160">
+          <p15:clr>
+            <a:srgbClr val="A4A3A4"/>
+          </p15:clr>
+        </p15:guide>
+        <p15:guide id="2" pos="2880">
+          <p15:clr>
+            <a:srgbClr val="A4A3A4"/>
+          </p15:clr>
+        </p15:guide>
+      </p15:sldGuideLst>
+    </p:ext>
+  </p:extLst>
 </p:presentation>
 </file>
 
@@ -877,7 +893,7 @@
 <dgm:dataModel xmlns:dgm="http://schemas.openxmlformats.org/drawingml/2006/diagram" xmlns:a="http://schemas.openxmlformats.org/drawingml/2006/main">
   <dgm:ptLst>
     <dgm:pt modelId="{15570CFE-176A-42D4-AAC1-8AD6679F3099}" type="doc">
-      <dgm:prSet loTypeId="urn:microsoft.com/office/officeart/2005/8/layout/default" loCatId="list" qsTypeId="urn:microsoft.com/office/officeart/2005/8/quickstyle/simple1" qsCatId="simple" csTypeId="urn:microsoft.com/office/officeart/2005/8/colors/accent1_2" csCatId="accent1" phldr="1"/>
+      <dgm:prSet loTypeId="urn:microsoft.com/office/officeart/2005/8/layout/default#1" loCatId="list" qsTypeId="urn:microsoft.com/office/officeart/2005/8/quickstyle/simple1" qsCatId="simple" csTypeId="urn:microsoft.com/office/officeart/2005/8/colors/accent1_2" csCatId="accent1" phldr="1"/>
       <dgm:spPr/>
       <dgm:t>
         <a:bodyPr/>
@@ -1304,38 +1320,530 @@
     </dgm:pt>
   </dgm:ptLst>
   <dgm:cxnLst>
-    <dgm:cxn modelId="{AB317DB7-3C14-4642-92F5-D4B0CB06DB3A}" type="presOf" srcId="{C9C8D41B-7B10-406A-96D2-22E2F1C33AB7}" destId="{216F723B-75FC-4AFB-987A-2D5ADAAD1426}" srcOrd="0" destOrd="0" presId="urn:microsoft.com/office/officeart/2005/8/layout/default"/>
+    <dgm:cxn modelId="{F71B9163-F4BA-4A8F-86B3-CA40A4019DD5}" type="presOf" srcId="{38D4E6C4-4549-4E88-8B8A-8B680B710C67}" destId="{619D394C-7BE8-4B4A-B466-58591A5D7E8C}" srcOrd="0" destOrd="0" presId="urn:microsoft.com/office/officeart/2005/8/layout/default#1"/>
+    <dgm:cxn modelId="{78B9C3A3-65C0-4397-861C-041B78F0348D}" type="presOf" srcId="{B36B14EA-1ECC-4FB8-B25E-2D571190B8BE}" destId="{B748685B-D4ED-4ECE-88A7-9074F0403905}" srcOrd="0" destOrd="0" presId="urn:microsoft.com/office/officeart/2005/8/layout/default#1"/>
     <dgm:cxn modelId="{086229D5-864C-44CD-B581-913A6804C1A4}" srcId="{15570CFE-176A-42D4-AAC1-8AD6679F3099}" destId="{A442E94A-5443-440C-9CD4-6CDD577A8718}" srcOrd="5" destOrd="0" parTransId="{43DEFB6F-86B2-44FD-966C-3E716D2A19B8}" sibTransId="{C69AE415-83B2-403B-B8EF-8BD4CF4B3DE6}"/>
-    <dgm:cxn modelId="{16A62162-E5FD-4B6A-ABDE-3AEF1F479B18}" type="presOf" srcId="{DD4F70C2-C2FB-4DED-B346-3F46B5C8C744}" destId="{6E75909A-DD64-400E-8062-DB5DE1EFEEAB}" srcOrd="0" destOrd="0" presId="urn:microsoft.com/office/officeart/2005/8/layout/default"/>
-    <dgm:cxn modelId="{F36DCE52-D301-42E5-A943-2BE4279AC63F}" type="presOf" srcId="{15570CFE-176A-42D4-AAC1-8AD6679F3099}" destId="{C71A8E77-E2AB-4BC4-9DC8-CFD5CFBC13E8}" srcOrd="0" destOrd="0" presId="urn:microsoft.com/office/officeart/2005/8/layout/default"/>
+    <dgm:cxn modelId="{11CBA53F-EECB-4104-8BDE-02E45FCF9862}" srcId="{15570CFE-176A-42D4-AAC1-8AD6679F3099}" destId="{38D4E6C4-4549-4E88-8B8A-8B680B710C67}" srcOrd="1" destOrd="0" parTransId="{B0AA0DF8-BDB2-417B-BBB0-92CEB2F51651}" sibTransId="{250E8339-2135-4C17-9CD0-2F4B9A749CAB}"/>
+    <dgm:cxn modelId="{7B64E452-1F3A-47B0-BE6C-442FE2E4446A}" type="presOf" srcId="{A442E94A-5443-440C-9CD4-6CDD577A8718}" destId="{3FCC99D6-4692-4327-A8D6-7B22192D170C}" srcOrd="0" destOrd="0" presId="urn:microsoft.com/office/officeart/2005/8/layout/default#1"/>
     <dgm:cxn modelId="{4772B205-1529-49B3-AEF4-A7B2C4BC06E4}" srcId="{15570CFE-176A-42D4-AAC1-8AD6679F3099}" destId="{DD4F70C2-C2FB-4DED-B346-3F46B5C8C744}" srcOrd="2" destOrd="0" parTransId="{7A832436-42A4-4673-B9F9-8CF396803C12}" sibTransId="{094EE5D4-5226-49BB-B859-9A068CC5FF9B}"/>
+    <dgm:cxn modelId="{2B1D6F97-7582-4CDE-9AFF-0715446195B8}" srcId="{15570CFE-176A-42D4-AAC1-8AD6679F3099}" destId="{C9C8D41B-7B10-406A-96D2-22E2F1C33AB7}" srcOrd="0" destOrd="0" parTransId="{F5367B3D-351E-45E3-B587-44DF94618FEE}" sibTransId="{06A49C23-CE42-4576-9F90-C02A1BDC69CF}"/>
     <dgm:cxn modelId="{3543D507-549B-43C1-B0D9-5E4BBA015EA6}" srcId="{15570CFE-176A-42D4-AAC1-8AD6679F3099}" destId="{B36B14EA-1ECC-4FB8-B25E-2D571190B8BE}" srcOrd="4" destOrd="0" parTransId="{96B74648-A0B0-4FAA-BE1F-AD7F4449A9FD}" sibTransId="{D055B043-DD5B-4C75-8893-031D514CBC1F}"/>
-    <dgm:cxn modelId="{11CBA53F-EECB-4104-8BDE-02E45FCF9862}" srcId="{15570CFE-176A-42D4-AAC1-8AD6679F3099}" destId="{38D4E6C4-4549-4E88-8B8A-8B680B710C67}" srcOrd="1" destOrd="0" parTransId="{B0AA0DF8-BDB2-417B-BBB0-92CEB2F51651}" sibTransId="{250E8339-2135-4C17-9CD0-2F4B9A749CAB}"/>
+    <dgm:cxn modelId="{F36DCE52-D301-42E5-A943-2BE4279AC63F}" type="presOf" srcId="{15570CFE-176A-42D4-AAC1-8AD6679F3099}" destId="{C71A8E77-E2AB-4BC4-9DC8-CFD5CFBC13E8}" srcOrd="0" destOrd="0" presId="urn:microsoft.com/office/officeart/2005/8/layout/default#1"/>
     <dgm:cxn modelId="{597DF89F-37AC-4761-9504-CAAAA0EE0EA9}" srcId="{15570CFE-176A-42D4-AAC1-8AD6679F3099}" destId="{BA8E8704-8643-4C37-8206-5BEA6687719D}" srcOrd="3" destOrd="0" parTransId="{EE9D6AA5-8C38-4C00-AF28-1F30ADEA6349}" sibTransId="{090171B2-A243-4644-AAFE-10F35FB2819E}"/>
-    <dgm:cxn modelId="{F71B9163-F4BA-4A8F-86B3-CA40A4019DD5}" type="presOf" srcId="{38D4E6C4-4549-4E88-8B8A-8B680B710C67}" destId="{619D394C-7BE8-4B4A-B466-58591A5D7E8C}" srcOrd="0" destOrd="0" presId="urn:microsoft.com/office/officeart/2005/8/layout/default"/>
-    <dgm:cxn modelId="{224AA8FC-87E5-446E-8F7B-6F56EA1089E5}" type="presOf" srcId="{BA8E8704-8643-4C37-8206-5BEA6687719D}" destId="{D7A8DA2B-CFD5-4A8F-8484-9EC1815A5D06}" srcOrd="0" destOrd="0" presId="urn:microsoft.com/office/officeart/2005/8/layout/default"/>
-    <dgm:cxn modelId="{78B9C3A3-65C0-4397-861C-041B78F0348D}" type="presOf" srcId="{B36B14EA-1ECC-4FB8-B25E-2D571190B8BE}" destId="{B748685B-D4ED-4ECE-88A7-9074F0403905}" srcOrd="0" destOrd="0" presId="urn:microsoft.com/office/officeart/2005/8/layout/default"/>
-    <dgm:cxn modelId="{7B64E452-1F3A-47B0-BE6C-442FE2E4446A}" type="presOf" srcId="{A442E94A-5443-440C-9CD4-6CDD577A8718}" destId="{3FCC99D6-4692-4327-A8D6-7B22192D170C}" srcOrd="0" destOrd="0" presId="urn:microsoft.com/office/officeart/2005/8/layout/default"/>
-    <dgm:cxn modelId="{2B1D6F97-7582-4CDE-9AFF-0715446195B8}" srcId="{15570CFE-176A-42D4-AAC1-8AD6679F3099}" destId="{C9C8D41B-7B10-406A-96D2-22E2F1C33AB7}" srcOrd="0" destOrd="0" parTransId="{F5367B3D-351E-45E3-B587-44DF94618FEE}" sibTransId="{06A49C23-CE42-4576-9F90-C02A1BDC69CF}"/>
-    <dgm:cxn modelId="{AFFFD968-155A-41D2-9B6C-D42E824B3780}" type="presParOf" srcId="{C71A8E77-E2AB-4BC4-9DC8-CFD5CFBC13E8}" destId="{216F723B-75FC-4AFB-987A-2D5ADAAD1426}" srcOrd="0" destOrd="0" presId="urn:microsoft.com/office/officeart/2005/8/layout/default"/>
-    <dgm:cxn modelId="{81B6F9D8-82CD-4F10-BD4F-00348506300F}" type="presParOf" srcId="{C71A8E77-E2AB-4BC4-9DC8-CFD5CFBC13E8}" destId="{D47FBC94-3FB8-4DAE-8201-C34496E8B357}" srcOrd="1" destOrd="0" presId="urn:microsoft.com/office/officeart/2005/8/layout/default"/>
-    <dgm:cxn modelId="{C683592D-9104-4770-AB09-750CD73A677C}" type="presParOf" srcId="{C71A8E77-E2AB-4BC4-9DC8-CFD5CFBC13E8}" destId="{619D394C-7BE8-4B4A-B466-58591A5D7E8C}" srcOrd="2" destOrd="0" presId="urn:microsoft.com/office/officeart/2005/8/layout/default"/>
-    <dgm:cxn modelId="{4215BACF-EA5B-4289-86DD-2A1DDB717E09}" type="presParOf" srcId="{C71A8E77-E2AB-4BC4-9DC8-CFD5CFBC13E8}" destId="{50B16854-12C6-4FB2-B128-EB9E31BE4F1F}" srcOrd="3" destOrd="0" presId="urn:microsoft.com/office/officeart/2005/8/layout/default"/>
-    <dgm:cxn modelId="{A38DB529-93E7-4FD3-A88B-3C744798FA32}" type="presParOf" srcId="{C71A8E77-E2AB-4BC4-9DC8-CFD5CFBC13E8}" destId="{6E75909A-DD64-400E-8062-DB5DE1EFEEAB}" srcOrd="4" destOrd="0" presId="urn:microsoft.com/office/officeart/2005/8/layout/default"/>
-    <dgm:cxn modelId="{E1BD429D-023A-4140-B785-4C7EE9D2A83D}" type="presParOf" srcId="{C71A8E77-E2AB-4BC4-9DC8-CFD5CFBC13E8}" destId="{35E5F711-7C9C-4BCD-BB91-94E1227A010F}" srcOrd="5" destOrd="0" presId="urn:microsoft.com/office/officeart/2005/8/layout/default"/>
-    <dgm:cxn modelId="{4FB761C5-285C-4BDD-9662-8758767BC0D8}" type="presParOf" srcId="{C71A8E77-E2AB-4BC4-9DC8-CFD5CFBC13E8}" destId="{D7A8DA2B-CFD5-4A8F-8484-9EC1815A5D06}" srcOrd="6" destOrd="0" presId="urn:microsoft.com/office/officeart/2005/8/layout/default"/>
-    <dgm:cxn modelId="{2531E98F-15DB-44D3-9172-42CBA992A7A3}" type="presParOf" srcId="{C71A8E77-E2AB-4BC4-9DC8-CFD5CFBC13E8}" destId="{301B742E-25EE-41A0-98DD-31D38D99E360}" srcOrd="7" destOrd="0" presId="urn:microsoft.com/office/officeart/2005/8/layout/default"/>
-    <dgm:cxn modelId="{32A3C77D-348B-456A-891E-07FF3B532FE1}" type="presParOf" srcId="{C71A8E77-E2AB-4BC4-9DC8-CFD5CFBC13E8}" destId="{B748685B-D4ED-4ECE-88A7-9074F0403905}" srcOrd="8" destOrd="0" presId="urn:microsoft.com/office/officeart/2005/8/layout/default"/>
-    <dgm:cxn modelId="{8F03DA5A-A842-4CF9-96CC-FC53EE519C4E}" type="presParOf" srcId="{C71A8E77-E2AB-4BC4-9DC8-CFD5CFBC13E8}" destId="{8C26BE86-1260-45ED-A57B-4DB8A6563C4B}" srcOrd="9" destOrd="0" presId="urn:microsoft.com/office/officeart/2005/8/layout/default"/>
-    <dgm:cxn modelId="{0C052041-F0E6-49E8-9B54-3E50316FB8BC}" type="presParOf" srcId="{C71A8E77-E2AB-4BC4-9DC8-CFD5CFBC13E8}" destId="{3FCC99D6-4692-4327-A8D6-7B22192D170C}" srcOrd="10" destOrd="0" presId="urn:microsoft.com/office/officeart/2005/8/layout/default"/>
+    <dgm:cxn modelId="{AB317DB7-3C14-4642-92F5-D4B0CB06DB3A}" type="presOf" srcId="{C9C8D41B-7B10-406A-96D2-22E2F1C33AB7}" destId="{216F723B-75FC-4AFB-987A-2D5ADAAD1426}" srcOrd="0" destOrd="0" presId="urn:microsoft.com/office/officeart/2005/8/layout/default#1"/>
+    <dgm:cxn modelId="{224AA8FC-87E5-446E-8F7B-6F56EA1089E5}" type="presOf" srcId="{BA8E8704-8643-4C37-8206-5BEA6687719D}" destId="{D7A8DA2B-CFD5-4A8F-8484-9EC1815A5D06}" srcOrd="0" destOrd="0" presId="urn:microsoft.com/office/officeart/2005/8/layout/default#1"/>
+    <dgm:cxn modelId="{16A62162-E5FD-4B6A-ABDE-3AEF1F479B18}" type="presOf" srcId="{DD4F70C2-C2FB-4DED-B346-3F46B5C8C744}" destId="{6E75909A-DD64-400E-8062-DB5DE1EFEEAB}" srcOrd="0" destOrd="0" presId="urn:microsoft.com/office/officeart/2005/8/layout/default#1"/>
+    <dgm:cxn modelId="{AFFFD968-155A-41D2-9B6C-D42E824B3780}" type="presParOf" srcId="{C71A8E77-E2AB-4BC4-9DC8-CFD5CFBC13E8}" destId="{216F723B-75FC-4AFB-987A-2D5ADAAD1426}" srcOrd="0" destOrd="0" presId="urn:microsoft.com/office/officeart/2005/8/layout/default#1"/>
+    <dgm:cxn modelId="{81B6F9D8-82CD-4F10-BD4F-00348506300F}" type="presParOf" srcId="{C71A8E77-E2AB-4BC4-9DC8-CFD5CFBC13E8}" destId="{D47FBC94-3FB8-4DAE-8201-C34496E8B357}" srcOrd="1" destOrd="0" presId="urn:microsoft.com/office/officeart/2005/8/layout/default#1"/>
+    <dgm:cxn modelId="{C683592D-9104-4770-AB09-750CD73A677C}" type="presParOf" srcId="{C71A8E77-E2AB-4BC4-9DC8-CFD5CFBC13E8}" destId="{619D394C-7BE8-4B4A-B466-58591A5D7E8C}" srcOrd="2" destOrd="0" presId="urn:microsoft.com/office/officeart/2005/8/layout/default#1"/>
+    <dgm:cxn modelId="{4215BACF-EA5B-4289-86DD-2A1DDB717E09}" type="presParOf" srcId="{C71A8E77-E2AB-4BC4-9DC8-CFD5CFBC13E8}" destId="{50B16854-12C6-4FB2-B128-EB9E31BE4F1F}" srcOrd="3" destOrd="0" presId="urn:microsoft.com/office/officeart/2005/8/layout/default#1"/>
+    <dgm:cxn modelId="{A38DB529-93E7-4FD3-A88B-3C744798FA32}" type="presParOf" srcId="{C71A8E77-E2AB-4BC4-9DC8-CFD5CFBC13E8}" destId="{6E75909A-DD64-400E-8062-DB5DE1EFEEAB}" srcOrd="4" destOrd="0" presId="urn:microsoft.com/office/officeart/2005/8/layout/default#1"/>
+    <dgm:cxn modelId="{E1BD429D-023A-4140-B785-4C7EE9D2A83D}" type="presParOf" srcId="{C71A8E77-E2AB-4BC4-9DC8-CFD5CFBC13E8}" destId="{35E5F711-7C9C-4BCD-BB91-94E1227A010F}" srcOrd="5" destOrd="0" presId="urn:microsoft.com/office/officeart/2005/8/layout/default#1"/>
+    <dgm:cxn modelId="{4FB761C5-285C-4BDD-9662-8758767BC0D8}" type="presParOf" srcId="{C71A8E77-E2AB-4BC4-9DC8-CFD5CFBC13E8}" destId="{D7A8DA2B-CFD5-4A8F-8484-9EC1815A5D06}" srcOrd="6" destOrd="0" presId="urn:microsoft.com/office/officeart/2005/8/layout/default#1"/>
+    <dgm:cxn modelId="{2531E98F-15DB-44D3-9172-42CBA992A7A3}" type="presParOf" srcId="{C71A8E77-E2AB-4BC4-9DC8-CFD5CFBC13E8}" destId="{301B742E-25EE-41A0-98DD-31D38D99E360}" srcOrd="7" destOrd="0" presId="urn:microsoft.com/office/officeart/2005/8/layout/default#1"/>
+    <dgm:cxn modelId="{32A3C77D-348B-456A-891E-07FF3B532FE1}" type="presParOf" srcId="{C71A8E77-E2AB-4BC4-9DC8-CFD5CFBC13E8}" destId="{B748685B-D4ED-4ECE-88A7-9074F0403905}" srcOrd="8" destOrd="0" presId="urn:microsoft.com/office/officeart/2005/8/layout/default#1"/>
+    <dgm:cxn modelId="{8F03DA5A-A842-4CF9-96CC-FC53EE519C4E}" type="presParOf" srcId="{C71A8E77-E2AB-4BC4-9DC8-CFD5CFBC13E8}" destId="{8C26BE86-1260-45ED-A57B-4DB8A6563C4B}" srcOrd="9" destOrd="0" presId="urn:microsoft.com/office/officeart/2005/8/layout/default#1"/>
+    <dgm:cxn modelId="{0C052041-F0E6-49E8-9B54-3E50316FB8BC}" type="presParOf" srcId="{C71A8E77-E2AB-4BC4-9DC8-CFD5CFBC13E8}" destId="{3FCC99D6-4692-4327-A8D6-7B22192D170C}" srcOrd="10" destOrd="0" presId="urn:microsoft.com/office/officeart/2005/8/layout/default#1"/>
   </dgm:cxnLst>
   <dgm:bg/>
   <dgm:whole/>
+  <dgm:extLst>
+    <a:ext uri="http://schemas.microsoft.com/office/drawing/2008/diagram">
+      <dsp:dataModelExt xmlns:dsp="http://schemas.microsoft.com/office/drawing/2008/diagram" relId="rId6" minVer="http://schemas.openxmlformats.org/drawingml/2006/diagram"/>
+    </a:ext>
+  </dgm:extLst>
 </dgm:dataModel>
 </file>
 
+<file path=ppt/diagrams/drawing1.xml><?xml version="1.0" encoding="utf-8"?>
+<dsp:drawing xmlns:dgm="http://schemas.openxmlformats.org/drawingml/2006/diagram" xmlns:dsp="http://schemas.microsoft.com/office/drawing/2008/diagram" xmlns:a="http://schemas.openxmlformats.org/drawingml/2006/main">
+  <dsp:spTree>
+    <dsp:nvGrpSpPr>
+      <dsp:cNvPr id="0" name=""/>
+      <dsp:cNvGrpSpPr/>
+    </dsp:nvGrpSpPr>
+    <dsp:grpSpPr/>
+    <dsp:sp modelId="{216F723B-75FC-4AFB-987A-2D5ADAAD1426}">
+      <dsp:nvSpPr>
+        <dsp:cNvPr id="0" name=""/>
+        <dsp:cNvSpPr/>
+      </dsp:nvSpPr>
+      <dsp:spPr>
+        <a:xfrm>
+          <a:off x="0" y="522293"/>
+          <a:ext cx="2571749" cy="1543050"/>
+        </a:xfrm>
+        <a:prstGeom prst="rect">
+          <a:avLst/>
+        </a:prstGeom>
+        <a:solidFill>
+          <a:srgbClr val="1AB394"/>
+        </a:solidFill>
+        <a:ln w="19050" cap="flat" cmpd="sng" algn="ctr">
+          <a:solidFill>
+            <a:schemeClr val="lt1">
+              <a:hueOff val="0"/>
+              <a:satOff val="0"/>
+              <a:lumOff val="0"/>
+              <a:alphaOff val="0"/>
+            </a:schemeClr>
+          </a:solidFill>
+          <a:prstDash val="solid"/>
+        </a:ln>
+        <a:effectLst/>
+      </dsp:spPr>
+      <dsp:style>
+        <a:lnRef idx="2">
+          <a:scrgbClr r="0" g="0" b="0"/>
+        </a:lnRef>
+        <a:fillRef idx="1">
+          <a:scrgbClr r="0" g="0" b="0"/>
+        </a:fillRef>
+        <a:effectRef idx="0">
+          <a:scrgbClr r="0" g="0" b="0"/>
+        </a:effectRef>
+        <a:fontRef idx="minor">
+          <a:schemeClr val="lt1"/>
+        </a:fontRef>
+      </dsp:style>
+      <dsp:txBody>
+        <a:bodyPr spcFirstLastPara="0" vert="horz" wrap="square" lIns="80010" tIns="80010" rIns="80010" bIns="80010" numCol="1" spcCol="1270" anchor="ctr" anchorCtr="0">
+          <a:noAutofit/>
+        </a:bodyPr>
+        <a:lstStyle/>
+        <a:p>
+          <a:pPr lvl="0" algn="ctr" defTabSz="933450">
+            <a:lnSpc>
+              <a:spcPct val="90000"/>
+            </a:lnSpc>
+            <a:spcBef>
+              <a:spcPct val="0"/>
+            </a:spcBef>
+            <a:spcAft>
+              <a:spcPct val="35000"/>
+            </a:spcAft>
+          </a:pPr>
+          <a:r>
+            <a:rPr lang="de-DE" sz="2100" kern="1200" dirty="0" smtClean="0">
+              <a:solidFill>
+                <a:schemeClr val="tx1"/>
+              </a:solidFill>
+            </a:rPr>
+            <a:t>XML Import und Export</a:t>
+          </a:r>
+          <a:endParaRPr lang="de-DE" sz="2100" kern="1200" dirty="0">
+            <a:solidFill>
+              <a:schemeClr val="tx1"/>
+            </a:solidFill>
+          </a:endParaRPr>
+        </a:p>
+      </dsp:txBody>
+      <dsp:txXfrm>
+        <a:off x="0" y="522293"/>
+        <a:ext cx="2571749" cy="1543050"/>
+      </dsp:txXfrm>
+    </dsp:sp>
+    <dsp:sp modelId="{619D394C-7BE8-4B4A-B466-58591A5D7E8C}">
+      <dsp:nvSpPr>
+        <dsp:cNvPr id="0" name=""/>
+        <dsp:cNvSpPr/>
+      </dsp:nvSpPr>
+      <dsp:spPr>
+        <a:xfrm>
+          <a:off x="2828925" y="522293"/>
+          <a:ext cx="2571749" cy="1543050"/>
+        </a:xfrm>
+        <a:prstGeom prst="rect">
+          <a:avLst/>
+        </a:prstGeom>
+        <a:solidFill>
+          <a:srgbClr val="1AB394"/>
+        </a:solidFill>
+        <a:ln w="19050" cap="flat" cmpd="sng" algn="ctr">
+          <a:solidFill>
+            <a:schemeClr val="lt1">
+              <a:hueOff val="0"/>
+              <a:satOff val="0"/>
+              <a:lumOff val="0"/>
+              <a:alphaOff val="0"/>
+            </a:schemeClr>
+          </a:solidFill>
+          <a:prstDash val="solid"/>
+        </a:ln>
+        <a:effectLst/>
+      </dsp:spPr>
+      <dsp:style>
+        <a:lnRef idx="2">
+          <a:scrgbClr r="0" g="0" b="0"/>
+        </a:lnRef>
+        <a:fillRef idx="1">
+          <a:scrgbClr r="0" g="0" b="0"/>
+        </a:fillRef>
+        <a:effectRef idx="0">
+          <a:scrgbClr r="0" g="0" b="0"/>
+        </a:effectRef>
+        <a:fontRef idx="minor">
+          <a:schemeClr val="lt1"/>
+        </a:fontRef>
+      </dsp:style>
+      <dsp:txBody>
+        <a:bodyPr spcFirstLastPara="0" vert="horz" wrap="square" lIns="80010" tIns="80010" rIns="80010" bIns="80010" numCol="1" spcCol="1270" anchor="ctr" anchorCtr="0">
+          <a:noAutofit/>
+        </a:bodyPr>
+        <a:lstStyle/>
+        <a:p>
+          <a:pPr lvl="0" algn="ctr" defTabSz="933450">
+            <a:lnSpc>
+              <a:spcPct val="90000"/>
+            </a:lnSpc>
+            <a:spcBef>
+              <a:spcPct val="0"/>
+            </a:spcBef>
+            <a:spcAft>
+              <a:spcPct val="35000"/>
+            </a:spcAft>
+          </a:pPr>
+          <a:r>
+            <a:rPr lang="de-DE" sz="2100" kern="1200" dirty="0" smtClean="0">
+              <a:solidFill>
+                <a:schemeClr val="tx1"/>
+              </a:solidFill>
+            </a:rPr>
+            <a:t>Mengenplanung</a:t>
+          </a:r>
+        </a:p>
+      </dsp:txBody>
+      <dsp:txXfrm>
+        <a:off x="2828925" y="522293"/>
+        <a:ext cx="2571749" cy="1543050"/>
+      </dsp:txXfrm>
+    </dsp:sp>
+    <dsp:sp modelId="{6E75909A-DD64-400E-8062-DB5DE1EFEEAB}">
+      <dsp:nvSpPr>
+        <dsp:cNvPr id="0" name=""/>
+        <dsp:cNvSpPr/>
+      </dsp:nvSpPr>
+      <dsp:spPr>
+        <a:xfrm>
+          <a:off x="5657849" y="522293"/>
+          <a:ext cx="2571749" cy="1543050"/>
+        </a:xfrm>
+        <a:prstGeom prst="rect">
+          <a:avLst/>
+        </a:prstGeom>
+        <a:solidFill>
+          <a:srgbClr val="1AB394"/>
+        </a:solidFill>
+        <a:ln w="19050" cap="flat" cmpd="sng" algn="ctr">
+          <a:solidFill>
+            <a:schemeClr val="lt1">
+              <a:hueOff val="0"/>
+              <a:satOff val="0"/>
+              <a:lumOff val="0"/>
+              <a:alphaOff val="0"/>
+            </a:schemeClr>
+          </a:solidFill>
+          <a:prstDash val="solid"/>
+        </a:ln>
+        <a:effectLst/>
+      </dsp:spPr>
+      <dsp:style>
+        <a:lnRef idx="2">
+          <a:scrgbClr r="0" g="0" b="0"/>
+        </a:lnRef>
+        <a:fillRef idx="1">
+          <a:scrgbClr r="0" g="0" b="0"/>
+        </a:fillRef>
+        <a:effectRef idx="0">
+          <a:scrgbClr r="0" g="0" b="0"/>
+        </a:effectRef>
+        <a:fontRef idx="minor">
+          <a:schemeClr val="lt1"/>
+        </a:fontRef>
+      </dsp:style>
+      <dsp:txBody>
+        <a:bodyPr spcFirstLastPara="0" vert="horz" wrap="square" lIns="80010" tIns="80010" rIns="80010" bIns="80010" numCol="1" spcCol="1270" anchor="ctr" anchorCtr="0">
+          <a:noAutofit/>
+        </a:bodyPr>
+        <a:lstStyle/>
+        <a:p>
+          <a:pPr lvl="0" algn="ctr" defTabSz="933450">
+            <a:lnSpc>
+              <a:spcPct val="90000"/>
+            </a:lnSpc>
+            <a:spcBef>
+              <a:spcPct val="0"/>
+            </a:spcBef>
+            <a:spcAft>
+              <a:spcPct val="35000"/>
+            </a:spcAft>
+          </a:pPr>
+          <a:r>
+            <a:rPr lang="de-DE" sz="2100" kern="1200" dirty="0" smtClean="0">
+              <a:solidFill>
+                <a:schemeClr val="tx1"/>
+              </a:solidFill>
+            </a:rPr>
+            <a:t>Bestellverwaltung</a:t>
+          </a:r>
+          <a:endParaRPr lang="de-DE" sz="2100" kern="1200" dirty="0">
+            <a:solidFill>
+              <a:schemeClr val="tx1"/>
+            </a:solidFill>
+          </a:endParaRPr>
+        </a:p>
+      </dsp:txBody>
+      <dsp:txXfrm>
+        <a:off x="5657849" y="522293"/>
+        <a:ext cx="2571749" cy="1543050"/>
+      </dsp:txXfrm>
+    </dsp:sp>
+    <dsp:sp modelId="{D7A8DA2B-CFD5-4A8F-8484-9EC1815A5D06}">
+      <dsp:nvSpPr>
+        <dsp:cNvPr id="0" name=""/>
+        <dsp:cNvSpPr/>
+      </dsp:nvSpPr>
+      <dsp:spPr>
+        <a:xfrm>
+          <a:off x="0" y="2322518"/>
+          <a:ext cx="2571749" cy="1543050"/>
+        </a:xfrm>
+        <a:prstGeom prst="rect">
+          <a:avLst/>
+        </a:prstGeom>
+        <a:solidFill>
+          <a:srgbClr val="1AB394"/>
+        </a:solidFill>
+        <a:ln w="19050" cap="flat" cmpd="sng" algn="ctr">
+          <a:solidFill>
+            <a:schemeClr val="lt1">
+              <a:hueOff val="0"/>
+              <a:satOff val="0"/>
+              <a:lumOff val="0"/>
+              <a:alphaOff val="0"/>
+            </a:schemeClr>
+          </a:solidFill>
+          <a:prstDash val="solid"/>
+        </a:ln>
+        <a:effectLst/>
+      </dsp:spPr>
+      <dsp:style>
+        <a:lnRef idx="2">
+          <a:scrgbClr r="0" g="0" b="0"/>
+        </a:lnRef>
+        <a:fillRef idx="1">
+          <a:scrgbClr r="0" g="0" b="0"/>
+        </a:fillRef>
+        <a:effectRef idx="0">
+          <a:scrgbClr r="0" g="0" b="0"/>
+        </a:effectRef>
+        <a:fontRef idx="minor">
+          <a:schemeClr val="lt1"/>
+        </a:fontRef>
+      </dsp:style>
+      <dsp:txBody>
+        <a:bodyPr spcFirstLastPara="0" vert="horz" wrap="square" lIns="80010" tIns="80010" rIns="80010" bIns="80010" numCol="1" spcCol="1270" anchor="ctr" anchorCtr="0">
+          <a:noAutofit/>
+        </a:bodyPr>
+        <a:lstStyle/>
+        <a:p>
+          <a:pPr lvl="0" algn="ctr" defTabSz="933450">
+            <a:lnSpc>
+              <a:spcPct val="90000"/>
+            </a:lnSpc>
+            <a:spcBef>
+              <a:spcPct val="0"/>
+            </a:spcBef>
+            <a:spcAft>
+              <a:spcPct val="35000"/>
+            </a:spcAft>
+          </a:pPr>
+          <a:r>
+            <a:rPr lang="de-DE" sz="2100" kern="1200" dirty="0" smtClean="0">
+              <a:solidFill>
+                <a:schemeClr val="tx1"/>
+              </a:solidFill>
+            </a:rPr>
+            <a:t>Kapazitätsplanung</a:t>
+          </a:r>
+          <a:endParaRPr lang="de-DE" sz="2100" kern="1200" dirty="0">
+            <a:solidFill>
+              <a:schemeClr val="tx1"/>
+            </a:solidFill>
+          </a:endParaRPr>
+        </a:p>
+      </dsp:txBody>
+      <dsp:txXfrm>
+        <a:off x="0" y="2322518"/>
+        <a:ext cx="2571749" cy="1543050"/>
+      </dsp:txXfrm>
+    </dsp:sp>
+    <dsp:sp modelId="{B748685B-D4ED-4ECE-88A7-9074F0403905}">
+      <dsp:nvSpPr>
+        <dsp:cNvPr id="0" name=""/>
+        <dsp:cNvSpPr/>
+      </dsp:nvSpPr>
+      <dsp:spPr>
+        <a:xfrm>
+          <a:off x="2828925" y="2322518"/>
+          <a:ext cx="2571749" cy="1543050"/>
+        </a:xfrm>
+        <a:prstGeom prst="rect">
+          <a:avLst/>
+        </a:prstGeom>
+        <a:solidFill>
+          <a:srgbClr val="1AB394"/>
+        </a:solidFill>
+        <a:ln w="19050" cap="flat" cmpd="sng" algn="ctr">
+          <a:solidFill>
+            <a:schemeClr val="lt1">
+              <a:hueOff val="0"/>
+              <a:satOff val="0"/>
+              <a:lumOff val="0"/>
+              <a:alphaOff val="0"/>
+            </a:schemeClr>
+          </a:solidFill>
+          <a:prstDash val="solid"/>
+        </a:ln>
+        <a:effectLst/>
+      </dsp:spPr>
+      <dsp:style>
+        <a:lnRef idx="2">
+          <a:scrgbClr r="0" g="0" b="0"/>
+        </a:lnRef>
+        <a:fillRef idx="1">
+          <a:scrgbClr r="0" g="0" b="0"/>
+        </a:fillRef>
+        <a:effectRef idx="0">
+          <a:scrgbClr r="0" g="0" b="0"/>
+        </a:effectRef>
+        <a:fontRef idx="minor">
+          <a:schemeClr val="lt1"/>
+        </a:fontRef>
+      </dsp:style>
+      <dsp:txBody>
+        <a:bodyPr spcFirstLastPara="0" vert="horz" wrap="square" lIns="80010" tIns="80010" rIns="80010" bIns="80010" numCol="1" spcCol="1270" anchor="ctr" anchorCtr="0">
+          <a:noAutofit/>
+        </a:bodyPr>
+        <a:lstStyle/>
+        <a:p>
+          <a:pPr lvl="0" algn="ctr" defTabSz="933450">
+            <a:lnSpc>
+              <a:spcPct val="90000"/>
+            </a:lnSpc>
+            <a:spcBef>
+              <a:spcPct val="0"/>
+            </a:spcBef>
+            <a:spcAft>
+              <a:spcPct val="35000"/>
+            </a:spcAft>
+          </a:pPr>
+          <a:r>
+            <a:rPr lang="de-DE" sz="2100" kern="1200" dirty="0" smtClean="0">
+              <a:solidFill>
+                <a:schemeClr val="tx1"/>
+              </a:solidFill>
+            </a:rPr>
+            <a:t>Analyse und Statistiken</a:t>
+          </a:r>
+          <a:endParaRPr lang="de-DE" sz="2100" kern="1200" dirty="0">
+            <a:solidFill>
+              <a:schemeClr val="tx1"/>
+            </a:solidFill>
+          </a:endParaRPr>
+        </a:p>
+      </dsp:txBody>
+      <dsp:txXfrm>
+        <a:off x="2828925" y="2322518"/>
+        <a:ext cx="2571749" cy="1543050"/>
+      </dsp:txXfrm>
+    </dsp:sp>
+    <dsp:sp modelId="{3FCC99D6-4692-4327-A8D6-7B22192D170C}">
+      <dsp:nvSpPr>
+        <dsp:cNvPr id="0" name=""/>
+        <dsp:cNvSpPr/>
+      </dsp:nvSpPr>
+      <dsp:spPr>
+        <a:xfrm>
+          <a:off x="5657849" y="2322518"/>
+          <a:ext cx="2571749" cy="1543050"/>
+        </a:xfrm>
+        <a:prstGeom prst="rect">
+          <a:avLst/>
+        </a:prstGeom>
+        <a:solidFill>
+          <a:srgbClr val="1AB394"/>
+        </a:solidFill>
+        <a:ln w="19050" cap="flat" cmpd="sng" algn="ctr">
+          <a:solidFill>
+            <a:schemeClr val="lt1">
+              <a:hueOff val="0"/>
+              <a:satOff val="0"/>
+              <a:lumOff val="0"/>
+              <a:alphaOff val="0"/>
+            </a:schemeClr>
+          </a:solidFill>
+          <a:prstDash val="solid"/>
+        </a:ln>
+        <a:effectLst/>
+      </dsp:spPr>
+      <dsp:style>
+        <a:lnRef idx="2">
+          <a:scrgbClr r="0" g="0" b="0"/>
+        </a:lnRef>
+        <a:fillRef idx="1">
+          <a:scrgbClr r="0" g="0" b="0"/>
+        </a:fillRef>
+        <a:effectRef idx="0">
+          <a:scrgbClr r="0" g="0" b="0"/>
+        </a:effectRef>
+        <a:fontRef idx="minor">
+          <a:schemeClr val="lt1"/>
+        </a:fontRef>
+      </dsp:style>
+      <dsp:txBody>
+        <a:bodyPr spcFirstLastPara="0" vert="horz" wrap="square" lIns="80010" tIns="80010" rIns="80010" bIns="80010" numCol="1" spcCol="1270" anchor="ctr" anchorCtr="0">
+          <a:noAutofit/>
+        </a:bodyPr>
+        <a:lstStyle/>
+        <a:p>
+          <a:pPr lvl="0" algn="ctr" defTabSz="933450">
+            <a:lnSpc>
+              <a:spcPct val="90000"/>
+            </a:lnSpc>
+            <a:spcBef>
+              <a:spcPct val="0"/>
+            </a:spcBef>
+            <a:spcAft>
+              <a:spcPct val="35000"/>
+            </a:spcAft>
+          </a:pPr>
+          <a:r>
+            <a:rPr lang="de-DE" sz="2100" kern="1200" dirty="0" smtClean="0">
+              <a:solidFill>
+                <a:schemeClr val="tx1"/>
+              </a:solidFill>
+            </a:rPr>
+            <a:t>Benutzerverwaltung</a:t>
+          </a:r>
+          <a:endParaRPr lang="de-DE" sz="2100" kern="1200" dirty="0">
+            <a:solidFill>
+              <a:schemeClr val="tx1"/>
+            </a:solidFill>
+          </a:endParaRPr>
+        </a:p>
+      </dsp:txBody>
+      <dsp:txXfrm>
+        <a:off x="5657849" y="2322518"/>
+        <a:ext cx="2571749" cy="1543050"/>
+      </dsp:txXfrm>
+    </dsp:sp>
+  </dsp:spTree>
+</dsp:drawing>
+</file>
+
 <file path=ppt/diagrams/layout1.xml><?xml version="1.0" encoding="utf-8"?>
-<dgm:layoutDef xmlns:dgm="http://schemas.openxmlformats.org/drawingml/2006/diagram" xmlns:a="http://schemas.openxmlformats.org/drawingml/2006/main" uniqueId="urn:microsoft.com/office/officeart/2005/8/layout/default">
+<dgm:layoutDef xmlns:dgm="http://schemas.openxmlformats.org/drawingml/2006/diagram" xmlns:a="http://schemas.openxmlformats.org/drawingml/2006/main" uniqueId="urn:microsoft.com/office/officeart/2005/8/layout/default#1">
   <dgm:title val=""/>
   <dgm:desc val=""/>
   <dgm:catLst>
@@ -2767,6 +3275,11 @@
         </p:txBody>
       </p:sp>
     </p:spTree>
+    <p:extLst>
+      <p:ext uri="{BB962C8B-B14F-4D97-AF65-F5344CB8AC3E}">
+        <p14:creationId xmlns:p14="http://schemas.microsoft.com/office/powerpoint/2010/main" val="3399177839"/>
+      </p:ext>
+    </p:extLst>
   </p:cSld>
   <p:clrMap bg1="lt1" tx1="dk1" bg2="lt2" tx2="dk2" accent1="accent1" accent2="accent2" accent3="accent3" accent4="accent4" accent5="accent5" accent6="accent6" hlink="hlink" folHlink="folHlink"/>
   <p:notesStyle>
@@ -2951,6 +3464,11 @@
         </p:txBody>
       </p:sp>
     </p:spTree>
+    <p:extLst>
+      <p:ext uri="{BB962C8B-B14F-4D97-AF65-F5344CB8AC3E}">
+        <p14:creationId xmlns:p14="http://schemas.microsoft.com/office/powerpoint/2010/main" val="1767036376"/>
+      </p:ext>
+    </p:extLst>
   </p:cSld>
   <p:clrMapOvr>
     <a:masterClrMapping/>
@@ -7046,6 +7564,36 @@
           </a:p>
         </p:txBody>
       </p:sp>
+      <p:pic>
+        <p:nvPicPr>
+          <p:cNvPr id="4" name="Grafik 3"/>
+          <p:cNvPicPr>
+            <a:picLocks noChangeAspect="1"/>
+          </p:cNvPicPr>
+          <p:nvPr/>
+        </p:nvPicPr>
+        <p:blipFill>
+          <a:blip r:embed="rId2">
+            <a:extLst>
+              <a:ext uri="{28A0092B-C50C-407E-A947-70E740481C1C}">
+                <a14:useLocalDpi xmlns:a14="http://schemas.microsoft.com/office/drawing/2010/main" val="0"/>
+              </a:ext>
+            </a:extLst>
+          </a:blip>
+          <a:stretch>
+            <a:fillRect/>
+          </a:stretch>
+        </p:blipFill>
+        <p:spPr>
+          <a:xfrm>
+            <a:off x="2123728" y="4005064"/>
+            <a:ext cx="2195736" cy="2195736"/>
+          </a:xfrm>
+          <a:prstGeom prst="rect">
+            <a:avLst/>
+          </a:prstGeom>
+        </p:spPr>
+      </p:pic>
     </p:spTree>
   </p:cSld>
   <p:clrMapOvr>
@@ -7577,7 +8125,7 @@
           <a:p>
             <a:r>
               <a:rPr lang="de-DE" dirty="0" err="1" smtClean="0"/>
-              <a:t>Typescript</a:t>
+              <a:t>TypeScript</a:t>
             </a:r>
             <a:endParaRPr lang="de-DE" dirty="0" smtClean="0"/>
           </a:p>
@@ -7592,8 +8140,8 @@
               <a:t> von </a:t>
             </a:r>
             <a:r>
-              <a:rPr lang="de-DE" dirty="0" err="1" smtClean="0"/>
-              <a:t>Javascript</a:t>
+              <a:rPr lang="de-DE" dirty="0" smtClean="0"/>
+              <a:t>JavaScript</a:t>
             </a:r>
             <a:endParaRPr lang="de-DE" dirty="0" smtClean="0"/>
           </a:p>
@@ -8504,8 +9052,13 @@
             <a:pPr lvl="1"/>
             <a:r>
               <a:rPr lang="de-DE" dirty="0" smtClean="0"/>
-              <a:t>Reduzieren der Lagerbeständen</a:t>
-            </a:r>
+              <a:t>Reduzieren der </a:t>
+            </a:r>
+            <a:r>
+              <a:rPr lang="de-DE" dirty="0" smtClean="0"/>
+              <a:t>Lagerbestände</a:t>
+            </a:r>
+            <a:endParaRPr lang="de-DE" dirty="0" smtClean="0"/>
           </a:p>
           <a:p>
             <a:pPr lvl="1"/>

</xml_diff>